<commit_message>
Add PDF version of the slides
</commit_message>
<xml_diff>
--- a/TensorFlow For The Masses.pptx
+++ b/TensorFlow For The Masses.pptx
@@ -13,6 +13,11 @@
     <p:sldId id="261" r:id="rId7"/>
     <p:sldId id="262" r:id="rId8"/>
     <p:sldId id="263" r:id="rId9"/>
+    <p:sldId id="264" r:id="rId10"/>
+    <p:sldId id="265" r:id="rId11"/>
+    <p:sldId id="266" r:id="rId12"/>
+    <p:sldId id="267" r:id="rId13"/>
+    <p:sldId id="268" r:id="rId14"/>
   </p:sldIdLst>
   <p:sldSz cx="12192000" cy="6858000"/>
   <p:notesSz cx="6858000" cy="9144000"/>
@@ -3130,6 +3135,941 @@
 </p:sld>
 </file>
 
+<file path=ppt/slides/slide10.xml><?xml version="1.0" encoding="utf-8"?>
+<p:sld xmlns:a="http://schemas.openxmlformats.org/drawingml/2006/main" xmlns:r="http://schemas.openxmlformats.org/officeDocument/2006/relationships" xmlns:p="http://schemas.openxmlformats.org/presentationml/2006/main">
+  <p:cSld>
+    <p:spTree>
+      <p:nvGrpSpPr>
+        <p:cNvPr id="1" name=""/>
+        <p:cNvGrpSpPr/>
+        <p:nvPr/>
+      </p:nvGrpSpPr>
+      <p:grpSpPr>
+        <a:xfrm>
+          <a:off x="0" y="0"/>
+          <a:ext cx="0" cy="0"/>
+          <a:chOff x="0" y="0"/>
+          <a:chExt cx="0" cy="0"/>
+        </a:xfrm>
+      </p:grpSpPr>
+      <p:sp>
+        <p:nvSpPr>
+          <p:cNvPr id="2" name="Title 1">
+            <a:extLst>
+              <a:ext uri="{FF2B5EF4-FFF2-40B4-BE49-F238E27FC236}">
+                <a16:creationId xmlns:a16="http://schemas.microsoft.com/office/drawing/2014/main" id="{A7E57442-9571-4F15-ADA6-3DBA814AD237}"/>
+              </a:ext>
+            </a:extLst>
+          </p:cNvPr>
+          <p:cNvSpPr>
+            <a:spLocks noGrp="1"/>
+          </p:cNvSpPr>
+          <p:nvPr>
+            <p:ph type="title"/>
+          </p:nvPr>
+        </p:nvSpPr>
+        <p:spPr>
+          <a:xfrm>
+            <a:off x="640079" y="2053641"/>
+            <a:ext cx="3669161" cy="2760098"/>
+          </a:xfrm>
+        </p:spPr>
+        <p:txBody>
+          <a:bodyPr>
+            <a:normAutofit/>
+          </a:bodyPr>
+          <a:lstStyle/>
+          <a:p>
+            <a:pPr algn="ctr"/>
+            <a:r>
+              <a:rPr lang="en-US" sz="4800" i="1" dirty="0">
+                <a:solidFill>
+                  <a:srgbClr val="FFFF00"/>
+                </a:solidFill>
+                <a:latin typeface="Bogle Black" panose="020B0A03020203060203" pitchFamily="34" charset="0"/>
+              </a:rPr>
+              <a:t>Off The Shelf Models</a:t>
+            </a:r>
+          </a:p>
+        </p:txBody>
+      </p:sp>
+      <p:pic>
+        <p:nvPicPr>
+          <p:cNvPr id="4" name="Picture 3">
+            <a:extLst>
+              <a:ext uri="{FF2B5EF4-FFF2-40B4-BE49-F238E27FC236}">
+                <a16:creationId xmlns:a16="http://schemas.microsoft.com/office/drawing/2014/main" id="{B76B1C5F-044D-4B62-B564-63CB08127DF9}"/>
+              </a:ext>
+            </a:extLst>
+          </p:cNvPr>
+          <p:cNvPicPr>
+            <a:picLocks noChangeAspect="1"/>
+          </p:cNvPicPr>
+          <p:nvPr/>
+        </p:nvPicPr>
+        <p:blipFill>
+          <a:blip r:embed="rId2">
+            <a:extLst>
+              <a:ext uri="{28A0092B-C50C-407E-A947-70E740481C1C}">
+                <a14:useLocalDpi xmlns:a14="http://schemas.microsoft.com/office/drawing/2010/main" val="0"/>
+              </a:ext>
+            </a:extLst>
+          </a:blip>
+          <a:stretch>
+            <a:fillRect/>
+          </a:stretch>
+        </p:blipFill>
+        <p:spPr>
+          <a:xfrm>
+            <a:off x="0" y="5572539"/>
+            <a:ext cx="1285461" cy="1285461"/>
+          </a:xfrm>
+          <a:prstGeom prst="rect">
+            <a:avLst/>
+          </a:prstGeom>
+        </p:spPr>
+      </p:pic>
+      <p:sp>
+        <p:nvSpPr>
+          <p:cNvPr id="3" name="TextBox 2">
+            <a:extLst>
+              <a:ext uri="{FF2B5EF4-FFF2-40B4-BE49-F238E27FC236}">
+                <a16:creationId xmlns:a16="http://schemas.microsoft.com/office/drawing/2014/main" id="{CC14791B-A678-4228-B316-2BC3BFC93143}"/>
+              </a:ext>
+            </a:extLst>
+          </p:cNvPr>
+          <p:cNvSpPr txBox="1"/>
+          <p:nvPr/>
+        </p:nvSpPr>
+        <p:spPr>
+          <a:xfrm>
+            <a:off x="5372100" y="2028617"/>
+            <a:ext cx="6179821" cy="2800767"/>
+          </a:xfrm>
+          <a:prstGeom prst="rect">
+            <a:avLst/>
+          </a:prstGeom>
+          <a:noFill/>
+        </p:spPr>
+        <p:txBody>
+          <a:bodyPr wrap="square" rtlCol="0" anchor="ctr">
+            <a:spAutoFit/>
+          </a:bodyPr>
+          <a:lstStyle/>
+          <a:p>
+            <a:r>
+              <a:rPr lang="en-US" sz="4400" dirty="0">
+                <a:solidFill>
+                  <a:srgbClr val="FFFF00"/>
+                </a:solidFill>
+                <a:latin typeface="Bogle" panose="020B0503020203060203" pitchFamily="34" charset="0"/>
+              </a:rPr>
+              <a:t>TF Hub</a:t>
+            </a:r>
+          </a:p>
+          <a:p>
+            <a:r>
+              <a:rPr lang="en-US" sz="4400" dirty="0">
+                <a:solidFill>
+                  <a:srgbClr val="FFFF00"/>
+                </a:solidFill>
+                <a:latin typeface="Bogle" panose="020B0503020203060203" pitchFamily="34" charset="0"/>
+              </a:rPr>
+              <a:t>	</a:t>
+            </a:r>
+            <a:r>
+              <a:rPr lang="en-US" sz="3200" dirty="0">
+                <a:solidFill>
+                  <a:srgbClr val="FFFF00"/>
+                </a:solidFill>
+                <a:latin typeface="Bogle" panose="020B0503020203060203" pitchFamily="34" charset="0"/>
+                <a:hlinkClick r:id="rId3">
+                  <a:extLst>
+                    <a:ext uri="{A12FA001-AC4F-418D-AE19-62706E023703}">
+                      <ahyp:hlinkClr xmlns:ahyp="http://schemas.microsoft.com/office/drawing/2018/hyperlinkcolor" val="tx"/>
+                    </a:ext>
+                  </a:extLst>
+                </a:hlinkClick>
+              </a:rPr>
+              <a:t>https://tfhub.dev</a:t>
+            </a:r>
+            <a:endParaRPr lang="en-US" sz="3200" dirty="0">
+              <a:solidFill>
+                <a:srgbClr val="FFFF00"/>
+              </a:solidFill>
+              <a:latin typeface="Bogle" panose="020B0503020203060203" pitchFamily="34" charset="0"/>
+            </a:endParaRPr>
+          </a:p>
+          <a:p>
+            <a:r>
+              <a:rPr lang="en-US" sz="4400" dirty="0">
+                <a:solidFill>
+                  <a:srgbClr val="FFFF00"/>
+                </a:solidFill>
+                <a:latin typeface="Bogle" panose="020B0503020203060203" pitchFamily="34" charset="0"/>
+              </a:rPr>
+              <a:t>Keras Applications</a:t>
+            </a:r>
+          </a:p>
+          <a:p>
+            <a:r>
+              <a:rPr lang="en-US" sz="4400" dirty="0">
+                <a:solidFill>
+                  <a:srgbClr val="FFFF00"/>
+                </a:solidFill>
+                <a:latin typeface="Bogle" panose="020B0503020203060203" pitchFamily="34" charset="0"/>
+              </a:rPr>
+              <a:t>	</a:t>
+            </a:r>
+            <a:r>
+              <a:rPr lang="en-US" sz="3200" dirty="0">
+                <a:solidFill>
+                  <a:srgbClr val="FFFF00"/>
+                </a:solidFill>
+                <a:latin typeface="Bogle" panose="020B0503020203060203" pitchFamily="34" charset="0"/>
+                <a:hlinkClick r:id="rId4">
+                  <a:extLst>
+                    <a:ext uri="{A12FA001-AC4F-418D-AE19-62706E023703}">
+                      <ahyp:hlinkClr xmlns:ahyp="http://schemas.microsoft.com/office/drawing/2018/hyperlinkcolor" val="tx"/>
+                    </a:ext>
+                  </a:extLst>
+                </a:hlinkClick>
+              </a:rPr>
+              <a:t>https://keras.io/applications/</a:t>
+            </a:r>
+            <a:endParaRPr lang="en-US" sz="3200" dirty="0">
+              <a:solidFill>
+                <a:srgbClr val="FFFF00"/>
+              </a:solidFill>
+              <a:latin typeface="Bogle" panose="020B0503020203060203" pitchFamily="34" charset="0"/>
+            </a:endParaRPr>
+          </a:p>
+        </p:txBody>
+      </p:sp>
+      <p:pic>
+        <p:nvPicPr>
+          <p:cNvPr id="7" name="Picture 6">
+            <a:extLst>
+              <a:ext uri="{FF2B5EF4-FFF2-40B4-BE49-F238E27FC236}">
+                <a16:creationId xmlns:a16="http://schemas.microsoft.com/office/drawing/2014/main" id="{23B58D1E-2738-4790-8ED3-569262748511}"/>
+              </a:ext>
+            </a:extLst>
+          </p:cNvPr>
+          <p:cNvPicPr>
+            <a:picLocks noChangeAspect="1"/>
+          </p:cNvPicPr>
+          <p:nvPr/>
+        </p:nvPicPr>
+        <p:blipFill>
+          <a:blip r:embed="rId5">
+            <a:extLst>
+              <a:ext uri="{28A0092B-C50C-407E-A947-70E740481C1C}">
+                <a14:useLocalDpi xmlns:a14="http://schemas.microsoft.com/office/drawing/2010/main" val="0"/>
+              </a:ext>
+            </a:extLst>
+          </a:blip>
+          <a:stretch>
+            <a:fillRect/>
+          </a:stretch>
+        </p:blipFill>
+        <p:spPr>
+          <a:xfrm>
+            <a:off x="1285461" y="5572539"/>
+            <a:ext cx="2542277" cy="1285461"/>
+          </a:xfrm>
+          <a:prstGeom prst="rect">
+            <a:avLst/>
+          </a:prstGeom>
+        </p:spPr>
+      </p:pic>
+    </p:spTree>
+    <p:extLst>
+      <p:ext uri="{BB962C8B-B14F-4D97-AF65-F5344CB8AC3E}">
+        <p14:creationId xmlns:p14="http://schemas.microsoft.com/office/powerpoint/2010/main" val="1368114391"/>
+      </p:ext>
+    </p:extLst>
+  </p:cSld>
+  <p:clrMapOvr>
+    <a:masterClrMapping/>
+  </p:clrMapOvr>
+</p:sld>
+</file>
+
+<file path=ppt/slides/slide11.xml><?xml version="1.0" encoding="utf-8"?>
+<p:sld xmlns:a="http://schemas.openxmlformats.org/drawingml/2006/main" xmlns:r="http://schemas.openxmlformats.org/officeDocument/2006/relationships" xmlns:p="http://schemas.openxmlformats.org/presentationml/2006/main">
+  <p:cSld>
+    <p:spTree>
+      <p:nvGrpSpPr>
+        <p:cNvPr id="1" name=""/>
+        <p:cNvGrpSpPr/>
+        <p:nvPr/>
+      </p:nvGrpSpPr>
+      <p:grpSpPr>
+        <a:xfrm>
+          <a:off x="0" y="0"/>
+          <a:ext cx="0" cy="0"/>
+          <a:chOff x="0" y="0"/>
+          <a:chExt cx="0" cy="0"/>
+        </a:xfrm>
+      </p:grpSpPr>
+      <p:sp>
+        <p:nvSpPr>
+          <p:cNvPr id="2" name="Title 1">
+            <a:extLst>
+              <a:ext uri="{FF2B5EF4-FFF2-40B4-BE49-F238E27FC236}">
+                <a16:creationId xmlns:a16="http://schemas.microsoft.com/office/drawing/2014/main" id="{A7E57442-9571-4F15-ADA6-3DBA814AD237}"/>
+              </a:ext>
+            </a:extLst>
+          </p:cNvPr>
+          <p:cNvSpPr>
+            <a:spLocks noGrp="1"/>
+          </p:cNvSpPr>
+          <p:nvPr>
+            <p:ph type="title"/>
+          </p:nvPr>
+        </p:nvSpPr>
+        <p:spPr>
+          <a:xfrm>
+            <a:off x="640079" y="2053641"/>
+            <a:ext cx="3669161" cy="2760098"/>
+          </a:xfrm>
+        </p:spPr>
+        <p:txBody>
+          <a:bodyPr>
+            <a:normAutofit/>
+          </a:bodyPr>
+          <a:lstStyle/>
+          <a:p>
+            <a:pPr algn="ctr"/>
+            <a:r>
+              <a:rPr lang="en-US" sz="4800" i="1" dirty="0">
+                <a:solidFill>
+                  <a:srgbClr val="FFFF00"/>
+                </a:solidFill>
+                <a:latin typeface="Bogle Black" panose="020B0A03020203060203" pitchFamily="34" charset="0"/>
+              </a:rPr>
+              <a:t>ALBERT</a:t>
+            </a:r>
+          </a:p>
+        </p:txBody>
+      </p:sp>
+      <p:pic>
+        <p:nvPicPr>
+          <p:cNvPr id="4" name="Picture 3">
+            <a:extLst>
+              <a:ext uri="{FF2B5EF4-FFF2-40B4-BE49-F238E27FC236}">
+                <a16:creationId xmlns:a16="http://schemas.microsoft.com/office/drawing/2014/main" id="{B76B1C5F-044D-4B62-B564-63CB08127DF9}"/>
+              </a:ext>
+            </a:extLst>
+          </p:cNvPr>
+          <p:cNvPicPr>
+            <a:picLocks noChangeAspect="1"/>
+          </p:cNvPicPr>
+          <p:nvPr/>
+        </p:nvPicPr>
+        <p:blipFill>
+          <a:blip r:embed="rId2">
+            <a:extLst>
+              <a:ext uri="{28A0092B-C50C-407E-A947-70E740481C1C}">
+                <a14:useLocalDpi xmlns:a14="http://schemas.microsoft.com/office/drawing/2010/main" val="0"/>
+              </a:ext>
+            </a:extLst>
+          </a:blip>
+          <a:stretch>
+            <a:fillRect/>
+          </a:stretch>
+        </p:blipFill>
+        <p:spPr>
+          <a:xfrm>
+            <a:off x="0" y="5572539"/>
+            <a:ext cx="1285461" cy="1285461"/>
+          </a:xfrm>
+          <a:prstGeom prst="rect">
+            <a:avLst/>
+          </a:prstGeom>
+        </p:spPr>
+      </p:pic>
+      <p:sp>
+        <p:nvSpPr>
+          <p:cNvPr id="3" name="TextBox 2">
+            <a:extLst>
+              <a:ext uri="{FF2B5EF4-FFF2-40B4-BE49-F238E27FC236}">
+                <a16:creationId xmlns:a16="http://schemas.microsoft.com/office/drawing/2014/main" id="{CC14791B-A678-4228-B316-2BC3BFC93143}"/>
+              </a:ext>
+            </a:extLst>
+          </p:cNvPr>
+          <p:cNvSpPr txBox="1"/>
+          <p:nvPr/>
+        </p:nvSpPr>
+        <p:spPr>
+          <a:xfrm>
+            <a:off x="5372100" y="2151729"/>
+            <a:ext cx="6179821" cy="2554545"/>
+          </a:xfrm>
+          <a:prstGeom prst="rect">
+            <a:avLst/>
+          </a:prstGeom>
+          <a:noFill/>
+        </p:spPr>
+        <p:txBody>
+          <a:bodyPr wrap="square" rtlCol="0" anchor="ctr">
+            <a:spAutoFit/>
+          </a:bodyPr>
+          <a:lstStyle/>
+          <a:p>
+            <a:r>
+              <a:rPr lang="en-US" sz="3200" dirty="0">
+                <a:solidFill>
+                  <a:srgbClr val="FFFF00"/>
+                </a:solidFill>
+                <a:latin typeface="Bogle" panose="020B0503020203060203" pitchFamily="34" charset="0"/>
+              </a:rPr>
+              <a:t>A State of the Art Natural Language Model:</a:t>
+            </a:r>
+          </a:p>
+          <a:p>
+            <a:endParaRPr lang="en-US" sz="3200" dirty="0">
+              <a:solidFill>
+                <a:srgbClr val="FFFF00"/>
+              </a:solidFill>
+              <a:latin typeface="Bogle" panose="020B0503020203060203" pitchFamily="34" charset="0"/>
+            </a:endParaRPr>
+          </a:p>
+          <a:p>
+            <a:r>
+              <a:rPr lang="en-US" sz="3200" b="1" dirty="0">
+                <a:solidFill>
+                  <a:srgbClr val="FFFF00"/>
+                </a:solidFill>
+                <a:latin typeface="Bogle" panose="020B0503020203060203" pitchFamily="34" charset="0"/>
+              </a:rPr>
+              <a:t>A</a:t>
+            </a:r>
+            <a:r>
+              <a:rPr lang="en-US" sz="3200" dirty="0">
+                <a:solidFill>
+                  <a:srgbClr val="FFFF00"/>
+                </a:solidFill>
+                <a:latin typeface="Bogle" panose="020B0503020203060203" pitchFamily="34" charset="0"/>
+              </a:rPr>
+              <a:t> </a:t>
+            </a:r>
+            <a:r>
+              <a:rPr lang="en-US" sz="3200" b="1" dirty="0">
+                <a:solidFill>
+                  <a:srgbClr val="FFFF00"/>
+                </a:solidFill>
+                <a:latin typeface="Bogle" panose="020B0503020203060203" pitchFamily="34" charset="0"/>
+              </a:rPr>
+              <a:t>L</a:t>
+            </a:r>
+            <a:r>
+              <a:rPr lang="en-US" sz="3200" dirty="0">
+                <a:solidFill>
+                  <a:srgbClr val="FFFF00"/>
+                </a:solidFill>
+                <a:latin typeface="Bogle" panose="020B0503020203060203" pitchFamily="34" charset="0"/>
+              </a:rPr>
+              <a:t>ite </a:t>
+            </a:r>
+            <a:r>
+              <a:rPr lang="en-US" sz="3200" b="1" dirty="0">
+                <a:solidFill>
+                  <a:srgbClr val="FFFF00"/>
+                </a:solidFill>
+                <a:latin typeface="Bogle" panose="020B0503020203060203" pitchFamily="34" charset="0"/>
+              </a:rPr>
+              <a:t>B</a:t>
+            </a:r>
+            <a:r>
+              <a:rPr lang="en-US" sz="3200" dirty="0">
+                <a:solidFill>
+                  <a:srgbClr val="FFFF00"/>
+                </a:solidFill>
+                <a:latin typeface="Bogle" panose="020B0503020203060203" pitchFamily="34" charset="0"/>
+              </a:rPr>
+              <a:t>idirectional </a:t>
+            </a:r>
+            <a:r>
+              <a:rPr lang="en-US" sz="3200" b="1" dirty="0">
+                <a:solidFill>
+                  <a:srgbClr val="FFFF00"/>
+                </a:solidFill>
+                <a:latin typeface="Bogle" panose="020B0503020203060203" pitchFamily="34" charset="0"/>
+              </a:rPr>
+              <a:t>E</a:t>
+            </a:r>
+            <a:r>
+              <a:rPr lang="en-US" sz="3200" dirty="0">
+                <a:solidFill>
+                  <a:srgbClr val="FFFF00"/>
+                </a:solidFill>
+                <a:latin typeface="Bogle" panose="020B0503020203060203" pitchFamily="34" charset="0"/>
+              </a:rPr>
+              <a:t>ncoding of </a:t>
+            </a:r>
+            <a:r>
+              <a:rPr lang="en-US" sz="3200" b="1" dirty="0">
+                <a:solidFill>
+                  <a:srgbClr val="FFFF00"/>
+                </a:solidFill>
+                <a:latin typeface="Bogle" panose="020B0503020203060203" pitchFamily="34" charset="0"/>
+              </a:rPr>
+              <a:t>R</a:t>
+            </a:r>
+            <a:r>
+              <a:rPr lang="en-US" sz="3200" dirty="0">
+                <a:solidFill>
+                  <a:srgbClr val="FFFF00"/>
+                </a:solidFill>
+                <a:latin typeface="Bogle" panose="020B0503020203060203" pitchFamily="34" charset="0"/>
+              </a:rPr>
+              <a:t>epresentational </a:t>
+            </a:r>
+            <a:r>
+              <a:rPr lang="en-US" sz="3200" b="1" dirty="0">
+                <a:solidFill>
+                  <a:srgbClr val="FFFF00"/>
+                </a:solidFill>
+                <a:latin typeface="Bogle" panose="020B0503020203060203" pitchFamily="34" charset="0"/>
+              </a:rPr>
+              <a:t>T</a:t>
+            </a:r>
+            <a:r>
+              <a:rPr lang="en-US" sz="3200" dirty="0">
+                <a:solidFill>
+                  <a:srgbClr val="FFFF00"/>
+                </a:solidFill>
+                <a:latin typeface="Bogle" panose="020B0503020203060203" pitchFamily="34" charset="0"/>
+              </a:rPr>
+              <a:t>ransformers</a:t>
+            </a:r>
+          </a:p>
+        </p:txBody>
+      </p:sp>
+      <p:pic>
+        <p:nvPicPr>
+          <p:cNvPr id="7" name="Picture 6">
+            <a:extLst>
+              <a:ext uri="{FF2B5EF4-FFF2-40B4-BE49-F238E27FC236}">
+                <a16:creationId xmlns:a16="http://schemas.microsoft.com/office/drawing/2014/main" id="{23B58D1E-2738-4790-8ED3-569262748511}"/>
+              </a:ext>
+            </a:extLst>
+          </p:cNvPr>
+          <p:cNvPicPr>
+            <a:picLocks noChangeAspect="1"/>
+          </p:cNvPicPr>
+          <p:nvPr/>
+        </p:nvPicPr>
+        <p:blipFill>
+          <a:blip r:embed="rId3">
+            <a:extLst>
+              <a:ext uri="{28A0092B-C50C-407E-A947-70E740481C1C}">
+                <a14:useLocalDpi xmlns:a14="http://schemas.microsoft.com/office/drawing/2010/main" val="0"/>
+              </a:ext>
+            </a:extLst>
+          </a:blip>
+          <a:stretch>
+            <a:fillRect/>
+          </a:stretch>
+        </p:blipFill>
+        <p:spPr>
+          <a:xfrm>
+            <a:off x="1285461" y="5572539"/>
+            <a:ext cx="2542277" cy="1285461"/>
+          </a:xfrm>
+          <a:prstGeom prst="rect">
+            <a:avLst/>
+          </a:prstGeom>
+        </p:spPr>
+      </p:pic>
+    </p:spTree>
+    <p:extLst>
+      <p:ext uri="{BB962C8B-B14F-4D97-AF65-F5344CB8AC3E}">
+        <p14:creationId xmlns:p14="http://schemas.microsoft.com/office/powerpoint/2010/main" val="744660586"/>
+      </p:ext>
+    </p:extLst>
+  </p:cSld>
+  <p:clrMapOvr>
+    <a:masterClrMapping/>
+  </p:clrMapOvr>
+</p:sld>
+</file>
+
+<file path=ppt/slides/slide12.xml><?xml version="1.0" encoding="utf-8"?>
+<p:sld xmlns:a="http://schemas.openxmlformats.org/drawingml/2006/main" xmlns:r="http://schemas.openxmlformats.org/officeDocument/2006/relationships" xmlns:p="http://schemas.openxmlformats.org/presentationml/2006/main">
+  <p:cSld>
+    <p:spTree>
+      <p:nvGrpSpPr>
+        <p:cNvPr id="1" name=""/>
+        <p:cNvGrpSpPr/>
+        <p:nvPr/>
+      </p:nvGrpSpPr>
+      <p:grpSpPr>
+        <a:xfrm>
+          <a:off x="0" y="0"/>
+          <a:ext cx="0" cy="0"/>
+          <a:chOff x="0" y="0"/>
+          <a:chExt cx="0" cy="0"/>
+        </a:xfrm>
+      </p:grpSpPr>
+      <p:sp>
+        <p:nvSpPr>
+          <p:cNvPr id="2" name="Title 1">
+            <a:extLst>
+              <a:ext uri="{FF2B5EF4-FFF2-40B4-BE49-F238E27FC236}">
+                <a16:creationId xmlns:a16="http://schemas.microsoft.com/office/drawing/2014/main" id="{A7E57442-9571-4F15-ADA6-3DBA814AD237}"/>
+              </a:ext>
+            </a:extLst>
+          </p:cNvPr>
+          <p:cNvSpPr>
+            <a:spLocks noGrp="1"/>
+          </p:cNvSpPr>
+          <p:nvPr>
+            <p:ph type="title"/>
+          </p:nvPr>
+        </p:nvSpPr>
+        <p:spPr>
+          <a:xfrm>
+            <a:off x="640079" y="2053641"/>
+            <a:ext cx="3669161" cy="2760098"/>
+          </a:xfrm>
+        </p:spPr>
+        <p:txBody>
+          <a:bodyPr>
+            <a:normAutofit/>
+          </a:bodyPr>
+          <a:lstStyle/>
+          <a:p>
+            <a:pPr algn="ctr"/>
+            <a:r>
+              <a:rPr lang="en-US" sz="4800" i="1" dirty="0">
+                <a:solidFill>
+                  <a:srgbClr val="FFFF00"/>
+                </a:solidFill>
+                <a:latin typeface="Bogle Black" panose="020B0A03020203060203" pitchFamily="34" charset="0"/>
+              </a:rPr>
+              <a:t>ALBERT</a:t>
+            </a:r>
+          </a:p>
+        </p:txBody>
+      </p:sp>
+      <p:pic>
+        <p:nvPicPr>
+          <p:cNvPr id="4" name="Picture 3">
+            <a:extLst>
+              <a:ext uri="{FF2B5EF4-FFF2-40B4-BE49-F238E27FC236}">
+                <a16:creationId xmlns:a16="http://schemas.microsoft.com/office/drawing/2014/main" id="{B76B1C5F-044D-4B62-B564-63CB08127DF9}"/>
+              </a:ext>
+            </a:extLst>
+          </p:cNvPr>
+          <p:cNvPicPr>
+            <a:picLocks noChangeAspect="1"/>
+          </p:cNvPicPr>
+          <p:nvPr/>
+        </p:nvPicPr>
+        <p:blipFill>
+          <a:blip r:embed="rId2">
+            <a:extLst>
+              <a:ext uri="{28A0092B-C50C-407E-A947-70E740481C1C}">
+                <a14:useLocalDpi xmlns:a14="http://schemas.microsoft.com/office/drawing/2010/main" val="0"/>
+              </a:ext>
+            </a:extLst>
+          </a:blip>
+          <a:stretch>
+            <a:fillRect/>
+          </a:stretch>
+        </p:blipFill>
+        <p:spPr>
+          <a:xfrm>
+            <a:off x="0" y="5572539"/>
+            <a:ext cx="1285461" cy="1285461"/>
+          </a:xfrm>
+          <a:prstGeom prst="rect">
+            <a:avLst/>
+          </a:prstGeom>
+        </p:spPr>
+      </p:pic>
+      <p:sp>
+        <p:nvSpPr>
+          <p:cNvPr id="3" name="TextBox 2">
+            <a:extLst>
+              <a:ext uri="{FF2B5EF4-FFF2-40B4-BE49-F238E27FC236}">
+                <a16:creationId xmlns:a16="http://schemas.microsoft.com/office/drawing/2014/main" id="{CC14791B-A678-4228-B316-2BC3BFC93143}"/>
+              </a:ext>
+            </a:extLst>
+          </p:cNvPr>
+          <p:cNvSpPr txBox="1"/>
+          <p:nvPr/>
+        </p:nvSpPr>
+        <p:spPr>
+          <a:xfrm>
+            <a:off x="5372100" y="3044281"/>
+            <a:ext cx="6179821" cy="769441"/>
+          </a:xfrm>
+          <a:prstGeom prst="rect">
+            <a:avLst/>
+          </a:prstGeom>
+          <a:noFill/>
+        </p:spPr>
+        <p:txBody>
+          <a:bodyPr wrap="square" rtlCol="0" anchor="ctr">
+            <a:spAutoFit/>
+          </a:bodyPr>
+          <a:lstStyle/>
+          <a:p>
+            <a:pPr algn="ctr"/>
+            <a:r>
+              <a:rPr lang="en-US" sz="4400" dirty="0">
+                <a:solidFill>
+                  <a:srgbClr val="FFFF00"/>
+                </a:solidFill>
+                <a:latin typeface="Bogle" panose="020B0503020203060203" pitchFamily="34" charset="0"/>
+              </a:rPr>
+              <a:t>CODE DEMO</a:t>
+            </a:r>
+          </a:p>
+        </p:txBody>
+      </p:sp>
+      <p:pic>
+        <p:nvPicPr>
+          <p:cNvPr id="7" name="Picture 6">
+            <a:extLst>
+              <a:ext uri="{FF2B5EF4-FFF2-40B4-BE49-F238E27FC236}">
+                <a16:creationId xmlns:a16="http://schemas.microsoft.com/office/drawing/2014/main" id="{23B58D1E-2738-4790-8ED3-569262748511}"/>
+              </a:ext>
+            </a:extLst>
+          </p:cNvPr>
+          <p:cNvPicPr>
+            <a:picLocks noChangeAspect="1"/>
+          </p:cNvPicPr>
+          <p:nvPr/>
+        </p:nvPicPr>
+        <p:blipFill>
+          <a:blip r:embed="rId3">
+            <a:extLst>
+              <a:ext uri="{28A0092B-C50C-407E-A947-70E740481C1C}">
+                <a14:useLocalDpi xmlns:a14="http://schemas.microsoft.com/office/drawing/2010/main" val="0"/>
+              </a:ext>
+            </a:extLst>
+          </a:blip>
+          <a:stretch>
+            <a:fillRect/>
+          </a:stretch>
+        </p:blipFill>
+        <p:spPr>
+          <a:xfrm>
+            <a:off x="1285461" y="5572539"/>
+            <a:ext cx="2542277" cy="1285461"/>
+          </a:xfrm>
+          <a:prstGeom prst="rect">
+            <a:avLst/>
+          </a:prstGeom>
+        </p:spPr>
+      </p:pic>
+    </p:spTree>
+    <p:extLst>
+      <p:ext uri="{BB962C8B-B14F-4D97-AF65-F5344CB8AC3E}">
+        <p14:creationId xmlns:p14="http://schemas.microsoft.com/office/powerpoint/2010/main" val="3796894303"/>
+      </p:ext>
+    </p:extLst>
+  </p:cSld>
+  <p:clrMapOvr>
+    <a:masterClrMapping/>
+  </p:clrMapOvr>
+</p:sld>
+</file>
+
+<file path=ppt/slides/slide13.xml><?xml version="1.0" encoding="utf-8"?>
+<p:sld xmlns:a="http://schemas.openxmlformats.org/drawingml/2006/main" xmlns:r="http://schemas.openxmlformats.org/officeDocument/2006/relationships" xmlns:p="http://schemas.openxmlformats.org/presentationml/2006/main">
+  <p:cSld>
+    <p:spTree>
+      <p:nvGrpSpPr>
+        <p:cNvPr id="1" name=""/>
+        <p:cNvGrpSpPr/>
+        <p:nvPr/>
+      </p:nvGrpSpPr>
+      <p:grpSpPr>
+        <a:xfrm>
+          <a:off x="0" y="0"/>
+          <a:ext cx="0" cy="0"/>
+          <a:chOff x="0" y="0"/>
+          <a:chExt cx="0" cy="0"/>
+        </a:xfrm>
+      </p:grpSpPr>
+      <p:sp>
+        <p:nvSpPr>
+          <p:cNvPr id="2" name="Title 1">
+            <a:extLst>
+              <a:ext uri="{FF2B5EF4-FFF2-40B4-BE49-F238E27FC236}">
+                <a16:creationId xmlns:a16="http://schemas.microsoft.com/office/drawing/2014/main" id="{A7E57442-9571-4F15-ADA6-3DBA814AD237}"/>
+              </a:ext>
+            </a:extLst>
+          </p:cNvPr>
+          <p:cNvSpPr>
+            <a:spLocks noGrp="1"/>
+          </p:cNvSpPr>
+          <p:nvPr>
+            <p:ph type="title"/>
+          </p:nvPr>
+        </p:nvSpPr>
+        <p:spPr>
+          <a:xfrm>
+            <a:off x="533401" y="668902"/>
+            <a:ext cx="11036300" cy="4512698"/>
+          </a:xfrm>
+        </p:spPr>
+        <p:txBody>
+          <a:bodyPr>
+            <a:normAutofit/>
+          </a:bodyPr>
+          <a:lstStyle/>
+          <a:p>
+            <a:pPr algn="ctr"/>
+            <a:r>
+              <a:rPr lang="en-US" sz="4800" i="1" dirty="0">
+                <a:solidFill>
+                  <a:srgbClr val="FFFF00"/>
+                </a:solidFill>
+                <a:latin typeface="Bogle Black" panose="020B0A03020203060203" pitchFamily="34" charset="0"/>
+              </a:rPr>
+              <a:t>Thank You!</a:t>
+            </a:r>
+            <a:br>
+              <a:rPr lang="en-US" sz="4800" i="1" dirty="0">
+                <a:solidFill>
+                  <a:srgbClr val="FFFF00"/>
+                </a:solidFill>
+                <a:latin typeface="Bogle Black" panose="020B0A03020203060203" pitchFamily="34" charset="0"/>
+              </a:rPr>
+            </a:br>
+            <a:r>
+              <a:rPr lang="en-US" sz="4800" i="1" dirty="0">
+                <a:solidFill>
+                  <a:srgbClr val="FFFF00"/>
+                </a:solidFill>
+                <a:latin typeface="Bogle Black" panose="020B0A03020203060203" pitchFamily="34" charset="0"/>
+              </a:rPr>
+              <a:t>Code and Slides:</a:t>
+            </a:r>
+            <a:br>
+              <a:rPr lang="en-US" sz="4800" i="1" dirty="0">
+                <a:solidFill>
+                  <a:srgbClr val="FFFF00"/>
+                </a:solidFill>
+                <a:latin typeface="Bogle Black" panose="020B0A03020203060203" pitchFamily="34" charset="0"/>
+              </a:rPr>
+            </a:br>
+            <a:r>
+              <a:rPr lang="en-US" sz="3200" i="1" dirty="0">
+                <a:solidFill>
+                  <a:srgbClr val="FFFF00"/>
+                </a:solidFill>
+                <a:latin typeface="Bogle Black" panose="020B0A03020203060203" pitchFamily="34" charset="0"/>
+                <a:hlinkClick r:id="rId2">
+                  <a:extLst>
+                    <a:ext uri="{A12FA001-AC4F-418D-AE19-62706E023703}">
+                      <ahyp:hlinkClr xmlns:ahyp="http://schemas.microsoft.com/office/drawing/2018/hyperlinkcolor" val="tx"/>
+                    </a:ext>
+                  </a:extLst>
+                </a:hlinkClick>
+              </a:rPr>
+              <a:t>https://github.com/krakrjak/data-science-meetup-2019-12-12</a:t>
+            </a:r>
+            <a:endParaRPr lang="en-US" sz="3200" i="1" dirty="0">
+              <a:solidFill>
+                <a:srgbClr val="FFFF00"/>
+              </a:solidFill>
+              <a:latin typeface="Bogle Black" panose="020B0A03020203060203" pitchFamily="34" charset="0"/>
+            </a:endParaRPr>
+          </a:p>
+        </p:txBody>
+      </p:sp>
+      <p:pic>
+        <p:nvPicPr>
+          <p:cNvPr id="4" name="Picture 3">
+            <a:extLst>
+              <a:ext uri="{FF2B5EF4-FFF2-40B4-BE49-F238E27FC236}">
+                <a16:creationId xmlns:a16="http://schemas.microsoft.com/office/drawing/2014/main" id="{B76B1C5F-044D-4B62-B564-63CB08127DF9}"/>
+              </a:ext>
+            </a:extLst>
+          </p:cNvPr>
+          <p:cNvPicPr>
+            <a:picLocks noChangeAspect="1"/>
+          </p:cNvPicPr>
+          <p:nvPr/>
+        </p:nvPicPr>
+        <p:blipFill>
+          <a:blip r:embed="rId3">
+            <a:extLst>
+              <a:ext uri="{28A0092B-C50C-407E-A947-70E740481C1C}">
+                <a14:useLocalDpi xmlns:a14="http://schemas.microsoft.com/office/drawing/2010/main" val="0"/>
+              </a:ext>
+            </a:extLst>
+          </a:blip>
+          <a:stretch>
+            <a:fillRect/>
+          </a:stretch>
+        </p:blipFill>
+        <p:spPr>
+          <a:xfrm>
+            <a:off x="0" y="5572539"/>
+            <a:ext cx="1285461" cy="1285461"/>
+          </a:xfrm>
+          <a:prstGeom prst="rect">
+            <a:avLst/>
+          </a:prstGeom>
+        </p:spPr>
+      </p:pic>
+      <p:pic>
+        <p:nvPicPr>
+          <p:cNvPr id="7" name="Picture 6">
+            <a:extLst>
+              <a:ext uri="{FF2B5EF4-FFF2-40B4-BE49-F238E27FC236}">
+                <a16:creationId xmlns:a16="http://schemas.microsoft.com/office/drawing/2014/main" id="{23B58D1E-2738-4790-8ED3-569262748511}"/>
+              </a:ext>
+            </a:extLst>
+          </p:cNvPr>
+          <p:cNvPicPr>
+            <a:picLocks noChangeAspect="1"/>
+          </p:cNvPicPr>
+          <p:nvPr/>
+        </p:nvPicPr>
+        <p:blipFill>
+          <a:blip r:embed="rId4">
+            <a:extLst>
+              <a:ext uri="{28A0092B-C50C-407E-A947-70E740481C1C}">
+                <a14:useLocalDpi xmlns:a14="http://schemas.microsoft.com/office/drawing/2010/main" val="0"/>
+              </a:ext>
+            </a:extLst>
+          </a:blip>
+          <a:stretch>
+            <a:fillRect/>
+          </a:stretch>
+        </p:blipFill>
+        <p:spPr>
+          <a:xfrm>
+            <a:off x="1285461" y="5572539"/>
+            <a:ext cx="2542277" cy="1285461"/>
+          </a:xfrm>
+          <a:prstGeom prst="rect">
+            <a:avLst/>
+          </a:prstGeom>
+        </p:spPr>
+      </p:pic>
+    </p:spTree>
+    <p:extLst>
+      <p:ext uri="{BB962C8B-B14F-4D97-AF65-F5344CB8AC3E}">
+        <p14:creationId xmlns:p14="http://schemas.microsoft.com/office/powerpoint/2010/main" val="751141492"/>
+      </p:ext>
+    </p:extLst>
+  </p:cSld>
+  <p:clrMapOvr>
+    <a:masterClrMapping/>
+  </p:clrMapOvr>
+</p:sld>
+</file>
+
 <file path=ppt/slides/slide2.xml><?xml version="1.0" encoding="utf-8"?>
 <p:sld xmlns:a="http://schemas.openxmlformats.org/drawingml/2006/main" xmlns:r="http://schemas.openxmlformats.org/officeDocument/2006/relationships" xmlns:p="http://schemas.openxmlformats.org/presentationml/2006/main">
   <p:cSld>
@@ -4688,6 +5628,190 @@
     <p:extLst>
       <p:ext uri="{BB962C8B-B14F-4D97-AF65-F5344CB8AC3E}">
         <p14:creationId xmlns:p14="http://schemas.microsoft.com/office/powerpoint/2010/main" val="2433640937"/>
+      </p:ext>
+    </p:extLst>
+  </p:cSld>
+  <p:clrMapOvr>
+    <a:masterClrMapping/>
+  </p:clrMapOvr>
+</p:sld>
+</file>
+
+<file path=ppt/slides/slide9.xml><?xml version="1.0" encoding="utf-8"?>
+<p:sld xmlns:a="http://schemas.openxmlformats.org/drawingml/2006/main" xmlns:r="http://schemas.openxmlformats.org/officeDocument/2006/relationships" xmlns:p="http://schemas.openxmlformats.org/presentationml/2006/main">
+  <p:cSld>
+    <p:spTree>
+      <p:nvGrpSpPr>
+        <p:cNvPr id="1" name=""/>
+        <p:cNvGrpSpPr/>
+        <p:nvPr/>
+      </p:nvGrpSpPr>
+      <p:grpSpPr>
+        <a:xfrm>
+          <a:off x="0" y="0"/>
+          <a:ext cx="0" cy="0"/>
+          <a:chOff x="0" y="0"/>
+          <a:chExt cx="0" cy="0"/>
+        </a:xfrm>
+      </p:grpSpPr>
+      <p:sp>
+        <p:nvSpPr>
+          <p:cNvPr id="2" name="Title 1">
+            <a:extLst>
+              <a:ext uri="{FF2B5EF4-FFF2-40B4-BE49-F238E27FC236}">
+                <a16:creationId xmlns:a16="http://schemas.microsoft.com/office/drawing/2014/main" id="{A7E57442-9571-4F15-ADA6-3DBA814AD237}"/>
+              </a:ext>
+            </a:extLst>
+          </p:cNvPr>
+          <p:cNvSpPr>
+            <a:spLocks noGrp="1"/>
+          </p:cNvSpPr>
+          <p:nvPr>
+            <p:ph type="title"/>
+          </p:nvPr>
+        </p:nvSpPr>
+        <p:spPr>
+          <a:xfrm>
+            <a:off x="640079" y="2053641"/>
+            <a:ext cx="3669161" cy="2760098"/>
+          </a:xfrm>
+        </p:spPr>
+        <p:txBody>
+          <a:bodyPr>
+            <a:normAutofit/>
+          </a:bodyPr>
+          <a:lstStyle/>
+          <a:p>
+            <a:pPr algn="ctr"/>
+            <a:r>
+              <a:rPr lang="en-US" sz="4800" i="1" dirty="0">
+                <a:solidFill>
+                  <a:srgbClr val="FFFF00"/>
+                </a:solidFill>
+                <a:latin typeface="Bogle Black" panose="020B0A03020203060203" pitchFamily="34" charset="0"/>
+              </a:rPr>
+              <a:t>Keras Basics</a:t>
+            </a:r>
+          </a:p>
+        </p:txBody>
+      </p:sp>
+      <p:pic>
+        <p:nvPicPr>
+          <p:cNvPr id="4" name="Picture 3">
+            <a:extLst>
+              <a:ext uri="{FF2B5EF4-FFF2-40B4-BE49-F238E27FC236}">
+                <a16:creationId xmlns:a16="http://schemas.microsoft.com/office/drawing/2014/main" id="{B76B1C5F-044D-4B62-B564-63CB08127DF9}"/>
+              </a:ext>
+            </a:extLst>
+          </p:cNvPr>
+          <p:cNvPicPr>
+            <a:picLocks noChangeAspect="1"/>
+          </p:cNvPicPr>
+          <p:nvPr/>
+        </p:nvPicPr>
+        <p:blipFill>
+          <a:blip r:embed="rId2">
+            <a:extLst>
+              <a:ext uri="{28A0092B-C50C-407E-A947-70E740481C1C}">
+                <a14:useLocalDpi xmlns:a14="http://schemas.microsoft.com/office/drawing/2010/main" val="0"/>
+              </a:ext>
+            </a:extLst>
+          </a:blip>
+          <a:stretch>
+            <a:fillRect/>
+          </a:stretch>
+        </p:blipFill>
+        <p:spPr>
+          <a:xfrm>
+            <a:off x="0" y="5572539"/>
+            <a:ext cx="1285461" cy="1285461"/>
+          </a:xfrm>
+          <a:prstGeom prst="rect">
+            <a:avLst/>
+          </a:prstGeom>
+        </p:spPr>
+      </p:pic>
+      <p:sp>
+        <p:nvSpPr>
+          <p:cNvPr id="3" name="TextBox 2">
+            <a:extLst>
+              <a:ext uri="{FF2B5EF4-FFF2-40B4-BE49-F238E27FC236}">
+                <a16:creationId xmlns:a16="http://schemas.microsoft.com/office/drawing/2014/main" id="{CC14791B-A678-4228-B316-2BC3BFC93143}"/>
+              </a:ext>
+            </a:extLst>
+          </p:cNvPr>
+          <p:cNvSpPr txBox="1"/>
+          <p:nvPr/>
+        </p:nvSpPr>
+        <p:spPr>
+          <a:xfrm>
+            <a:off x="5372100" y="3044279"/>
+            <a:ext cx="6179821" cy="769441"/>
+          </a:xfrm>
+          <a:prstGeom prst="rect">
+            <a:avLst/>
+          </a:prstGeom>
+          <a:noFill/>
+        </p:spPr>
+        <p:txBody>
+          <a:bodyPr wrap="square" rtlCol="0" anchor="ctr">
+            <a:spAutoFit/>
+          </a:bodyPr>
+          <a:lstStyle/>
+          <a:p>
+            <a:pPr algn="ctr"/>
+            <a:r>
+              <a:rPr lang="en-US" sz="4400" dirty="0">
+                <a:solidFill>
+                  <a:srgbClr val="FFFF00"/>
+                </a:solidFill>
+                <a:latin typeface="Bogle" panose="020B0503020203060203" pitchFamily="34" charset="0"/>
+              </a:rPr>
+              <a:t>CODE DEMO</a:t>
+            </a:r>
+          </a:p>
+        </p:txBody>
+      </p:sp>
+      <p:pic>
+        <p:nvPicPr>
+          <p:cNvPr id="7" name="Picture 6">
+            <a:extLst>
+              <a:ext uri="{FF2B5EF4-FFF2-40B4-BE49-F238E27FC236}">
+                <a16:creationId xmlns:a16="http://schemas.microsoft.com/office/drawing/2014/main" id="{23B58D1E-2738-4790-8ED3-569262748511}"/>
+              </a:ext>
+            </a:extLst>
+          </p:cNvPr>
+          <p:cNvPicPr>
+            <a:picLocks noChangeAspect="1"/>
+          </p:cNvPicPr>
+          <p:nvPr/>
+        </p:nvPicPr>
+        <p:blipFill>
+          <a:blip r:embed="rId3">
+            <a:extLst>
+              <a:ext uri="{28A0092B-C50C-407E-A947-70E740481C1C}">
+                <a14:useLocalDpi xmlns:a14="http://schemas.microsoft.com/office/drawing/2010/main" val="0"/>
+              </a:ext>
+            </a:extLst>
+          </a:blip>
+          <a:stretch>
+            <a:fillRect/>
+          </a:stretch>
+        </p:blipFill>
+        <p:spPr>
+          <a:xfrm>
+            <a:off x="1285461" y="5572539"/>
+            <a:ext cx="2542277" cy="1285461"/>
+          </a:xfrm>
+          <a:prstGeom prst="rect">
+            <a:avLst/>
+          </a:prstGeom>
+        </p:spPr>
+      </p:pic>
+    </p:spTree>
+    <p:extLst>
+      <p:ext uri="{BB962C8B-B14F-4D97-AF65-F5344CB8AC3E}">
+        <p14:creationId xmlns:p14="http://schemas.microsoft.com/office/powerpoint/2010/main" val="680000965"/>
       </p:ext>
     </p:extLst>
   </p:cSld>

</xml_diff>